<commit_message>
Added project timeline, deliverables, and title to the proposal
</commit_message>
<xml_diff>
--- a/ProjectProposal.pptx
+++ b/ProjectProposal.pptx
@@ -32,6 +32,8 @@
     <p:sldId id="328" r:id="rId26"/>
     <p:sldId id="332" r:id="rId27"/>
     <p:sldId id="329" r:id="rId28"/>
+    <p:sldId id="333" r:id="rId29"/>
+    <p:sldId id="334" r:id="rId30"/>
   </p:sldIdLst>
   <p:sldSz cx="12192000" cy="6858000"/>
   <p:notesSz cx="6858000" cy="9144000"/>
@@ -297,7 +299,7 @@
           <a:p>
             <a:fld id="{CD63FF02-0E8F-C94D-9333-E7E525B6484A}" type="datetimeFigureOut">
               <a:rPr lang="en-US" smtClean="0"/>
-              <a:t>1/21/21</a:t>
+              <a:t>2/11/2021</a:t>
             </a:fld>
             <a:endParaRPr lang="en-US"/>
           </a:p>
@@ -495,7 +497,7 @@
           <a:p>
             <a:fld id="{CD63FF02-0E8F-C94D-9333-E7E525B6484A}" type="datetimeFigureOut">
               <a:rPr lang="en-US" smtClean="0"/>
-              <a:t>1/21/21</a:t>
+              <a:t>2/11/2021</a:t>
             </a:fld>
             <a:endParaRPr lang="en-US"/>
           </a:p>
@@ -703,7 +705,7 @@
           <a:p>
             <a:fld id="{CD63FF02-0E8F-C94D-9333-E7E525B6484A}" type="datetimeFigureOut">
               <a:rPr lang="en-US" smtClean="0"/>
-              <a:t>1/21/21</a:t>
+              <a:t>2/11/2021</a:t>
             </a:fld>
             <a:endParaRPr lang="en-US"/>
           </a:p>
@@ -906,7 +908,7 @@
           <a:p>
             <a:fld id="{CD63FF02-0E8F-C94D-9333-E7E525B6484A}" type="datetimeFigureOut">
               <a:rPr lang="en-US" smtClean="0"/>
-              <a:t>1/21/21</a:t>
+              <a:t>2/11/2021</a:t>
             </a:fld>
             <a:endParaRPr lang="en-US"/>
           </a:p>
@@ -1181,7 +1183,7 @@
           <a:p>
             <a:fld id="{CD63FF02-0E8F-C94D-9333-E7E525B6484A}" type="datetimeFigureOut">
               <a:rPr lang="en-US" smtClean="0"/>
-              <a:t>1/21/21</a:t>
+              <a:t>2/11/2021</a:t>
             </a:fld>
             <a:endParaRPr lang="en-US"/>
           </a:p>
@@ -1446,7 +1448,7 @@
           <a:p>
             <a:fld id="{CD63FF02-0E8F-C94D-9333-E7E525B6484A}" type="datetimeFigureOut">
               <a:rPr lang="en-US" smtClean="0"/>
-              <a:t>1/21/21</a:t>
+              <a:t>2/11/2021</a:t>
             </a:fld>
             <a:endParaRPr lang="en-US"/>
           </a:p>
@@ -1858,7 +1860,7 @@
           <a:p>
             <a:fld id="{CD63FF02-0E8F-C94D-9333-E7E525B6484A}" type="datetimeFigureOut">
               <a:rPr lang="en-US" smtClean="0"/>
-              <a:t>1/21/21</a:t>
+              <a:t>2/11/2021</a:t>
             </a:fld>
             <a:endParaRPr lang="en-US"/>
           </a:p>
@@ -1999,7 +2001,7 @@
           <a:p>
             <a:fld id="{CD63FF02-0E8F-C94D-9333-E7E525B6484A}" type="datetimeFigureOut">
               <a:rPr lang="en-US" smtClean="0"/>
-              <a:t>1/21/21</a:t>
+              <a:t>2/11/2021</a:t>
             </a:fld>
             <a:endParaRPr lang="en-US"/>
           </a:p>
@@ -2112,7 +2114,7 @@
           <a:p>
             <a:fld id="{CD63FF02-0E8F-C94D-9333-E7E525B6484A}" type="datetimeFigureOut">
               <a:rPr lang="en-US" smtClean="0"/>
-              <a:t>1/21/21</a:t>
+              <a:t>2/11/2021</a:t>
             </a:fld>
             <a:endParaRPr lang="en-US"/>
           </a:p>
@@ -2423,7 +2425,7 @@
           <a:p>
             <a:fld id="{CD63FF02-0E8F-C94D-9333-E7E525B6484A}" type="datetimeFigureOut">
               <a:rPr lang="en-US" smtClean="0"/>
-              <a:t>1/21/21</a:t>
+              <a:t>2/11/2021</a:t>
             </a:fld>
             <a:endParaRPr lang="en-US"/>
           </a:p>
@@ -2711,7 +2713,7 @@
           <a:p>
             <a:fld id="{CD63FF02-0E8F-C94D-9333-E7E525B6484A}" type="datetimeFigureOut">
               <a:rPr lang="en-US" smtClean="0"/>
-              <a:t>1/21/21</a:t>
+              <a:t>2/11/2021</a:t>
             </a:fld>
             <a:endParaRPr lang="en-US"/>
           </a:p>
@@ -2961,7 +2963,7 @@
           <a:p>
             <a:fld id="{CD63FF02-0E8F-C94D-9333-E7E525B6484A}" type="datetimeFigureOut">
               <a:rPr lang="en-US" smtClean="0"/>
-              <a:t>1/21/21</a:t>
+              <a:t>2/11/2021</a:t>
             </a:fld>
             <a:endParaRPr lang="en-US"/>
           </a:p>
@@ -3394,7 +3396,12 @@
             <p:ph type="ctrTitle"/>
           </p:nvPr>
         </p:nvSpPr>
-        <p:spPr/>
+        <p:spPr>
+          <a:xfrm>
+            <a:off x="2009955" y="1122363"/>
+            <a:ext cx="10182045" cy="2387600"/>
+          </a:xfrm>
+        </p:spPr>
         <p:txBody>
           <a:bodyPr>
             <a:normAutofit fontScale="90000"/>
@@ -3403,7 +3410,14 @@
           <a:p>
             <a:r>
               <a:rPr lang="en-US" dirty="0"/>
-              <a:t>Neuromorphic Computing: Project Proposal</a:t>
+              <a:t>Neuromorphic Computing Project Proposal:</a:t>
+            </a:r>
+            <a:br>
+              <a:rPr lang="en-US" dirty="0"/>
+            </a:br>
+            <a:r>
+              <a:rPr lang="en-US" dirty="0"/>
+              <a:t>FPGA Hardware Acceleration of CNN based SDR Analysis  </a:t>
             </a:r>
           </a:p>
         </p:txBody>
@@ -12975,6 +12989,207 @@
 </p:sld>
 </file>
 
+<file path=ppt/slides/slide28.xml><?xml version="1.0" encoding="utf-8"?>
+<p:sld xmlns:a="http://schemas.openxmlformats.org/drawingml/2006/main" xmlns:r="http://schemas.openxmlformats.org/officeDocument/2006/relationships" xmlns:p="http://schemas.openxmlformats.org/presentationml/2006/main">
+  <p:cSld>
+    <p:spTree>
+      <p:nvGrpSpPr>
+        <p:cNvPr id="1" name=""/>
+        <p:cNvGrpSpPr/>
+        <p:nvPr/>
+      </p:nvGrpSpPr>
+      <p:grpSpPr>
+        <a:xfrm>
+          <a:off x="0" y="0"/>
+          <a:ext cx="0" cy="0"/>
+          <a:chOff x="0" y="0"/>
+          <a:chExt cx="0" cy="0"/>
+        </a:xfrm>
+      </p:grpSpPr>
+      <p:sp>
+        <p:nvSpPr>
+          <p:cNvPr id="2" name="Title 1">
+            <a:extLst>
+              <a:ext uri="{FF2B5EF4-FFF2-40B4-BE49-F238E27FC236}">
+                <a16:creationId xmlns:a16="http://schemas.microsoft.com/office/drawing/2014/main" id="{BBFFCFBD-10F3-A942-97D6-A91A58E96A53}"/>
+              </a:ext>
+            </a:extLst>
+          </p:cNvPr>
+          <p:cNvSpPr>
+            <a:spLocks noGrp="1"/>
+          </p:cNvSpPr>
+          <p:nvPr>
+            <p:ph type="title"/>
+          </p:nvPr>
+        </p:nvSpPr>
+        <p:spPr/>
+        <p:txBody>
+          <a:bodyPr/>
+          <a:lstStyle/>
+          <a:p>
+            <a:r>
+              <a:rPr lang="en-US" dirty="0"/>
+              <a:t>Project Timeline</a:t>
+            </a:r>
+          </a:p>
+        </p:txBody>
+      </p:sp>
+      <p:pic>
+        <p:nvPicPr>
+          <p:cNvPr id="9" name="Picture 8" descr="Table, timeline&#10;&#10;Description automatically generated">
+            <a:extLst>
+              <a:ext uri="{FF2B5EF4-FFF2-40B4-BE49-F238E27FC236}">
+                <a16:creationId xmlns:a16="http://schemas.microsoft.com/office/drawing/2014/main" id="{496DC404-E2C4-42C0-9665-898DA11CC12A}"/>
+              </a:ext>
+            </a:extLst>
+          </p:cNvPr>
+          <p:cNvPicPr>
+            <a:picLocks noChangeAspect="1"/>
+          </p:cNvPicPr>
+          <p:nvPr/>
+        </p:nvPicPr>
+        <p:blipFill>
+          <a:blip r:embed="rId2"/>
+          <a:stretch>
+            <a:fillRect/>
+          </a:stretch>
+        </p:blipFill>
+        <p:spPr>
+          <a:xfrm>
+            <a:off x="2085503" y="1690687"/>
+            <a:ext cx="10008392" cy="4292347"/>
+          </a:xfrm>
+          <a:prstGeom prst="rect">
+            <a:avLst/>
+          </a:prstGeom>
+        </p:spPr>
+      </p:pic>
+    </p:spTree>
+    <p:extLst>
+      <p:ext uri="{BB962C8B-B14F-4D97-AF65-F5344CB8AC3E}">
+        <p14:creationId xmlns:p14="http://schemas.microsoft.com/office/powerpoint/2010/main" val="529381319"/>
+      </p:ext>
+    </p:extLst>
+  </p:cSld>
+  <p:clrMapOvr>
+    <a:masterClrMapping/>
+  </p:clrMapOvr>
+</p:sld>
+</file>
+
+<file path=ppt/slides/slide29.xml><?xml version="1.0" encoding="utf-8"?>
+<p:sld xmlns:a="http://schemas.openxmlformats.org/drawingml/2006/main" xmlns:r="http://schemas.openxmlformats.org/officeDocument/2006/relationships" xmlns:p="http://schemas.openxmlformats.org/presentationml/2006/main">
+  <p:cSld>
+    <p:spTree>
+      <p:nvGrpSpPr>
+        <p:cNvPr id="1" name=""/>
+        <p:cNvGrpSpPr/>
+        <p:nvPr/>
+      </p:nvGrpSpPr>
+      <p:grpSpPr>
+        <a:xfrm>
+          <a:off x="0" y="0"/>
+          <a:ext cx="0" cy="0"/>
+          <a:chOff x="0" y="0"/>
+          <a:chExt cx="0" cy="0"/>
+        </a:xfrm>
+      </p:grpSpPr>
+      <p:sp>
+        <p:nvSpPr>
+          <p:cNvPr id="2" name="Title 1">
+            <a:extLst>
+              <a:ext uri="{FF2B5EF4-FFF2-40B4-BE49-F238E27FC236}">
+                <a16:creationId xmlns:a16="http://schemas.microsoft.com/office/drawing/2014/main" id="{BBFFCFBD-10F3-A942-97D6-A91A58E96A53}"/>
+              </a:ext>
+            </a:extLst>
+          </p:cNvPr>
+          <p:cNvSpPr>
+            <a:spLocks noGrp="1"/>
+          </p:cNvSpPr>
+          <p:nvPr>
+            <p:ph type="title"/>
+          </p:nvPr>
+        </p:nvSpPr>
+        <p:spPr/>
+        <p:txBody>
+          <a:bodyPr/>
+          <a:lstStyle/>
+          <a:p>
+            <a:r>
+              <a:rPr lang="en-US" dirty="0"/>
+              <a:t>Project Deliverables</a:t>
+            </a:r>
+          </a:p>
+        </p:txBody>
+      </p:sp>
+      <p:sp>
+        <p:nvSpPr>
+          <p:cNvPr id="3" name="Content Placeholder 2">
+            <a:extLst>
+              <a:ext uri="{FF2B5EF4-FFF2-40B4-BE49-F238E27FC236}">
+                <a16:creationId xmlns:a16="http://schemas.microsoft.com/office/drawing/2014/main" id="{8B5CE503-65D2-434B-B746-E03119BAFA7F}"/>
+              </a:ext>
+            </a:extLst>
+          </p:cNvPr>
+          <p:cNvSpPr>
+            <a:spLocks noGrp="1"/>
+          </p:cNvSpPr>
+          <p:nvPr>
+            <p:ph idx="1"/>
+          </p:nvPr>
+        </p:nvSpPr>
+        <p:spPr/>
+        <p:txBody>
+          <a:bodyPr/>
+          <a:lstStyle/>
+          <a:p>
+            <a:r>
+              <a:rPr lang="en-US" dirty="0"/>
+              <a:t>Python simulations of a pre-trained CNN for SDR analysis</a:t>
+            </a:r>
+          </a:p>
+          <a:p>
+            <a:r>
+              <a:rPr lang="en-US" dirty="0"/>
+              <a:t>FPGA implementation of CNN</a:t>
+            </a:r>
+          </a:p>
+          <a:p>
+            <a:r>
+              <a:rPr lang="en-US" dirty="0" err="1"/>
+              <a:t>Hspice</a:t>
+            </a:r>
+            <a:r>
+              <a:rPr lang="en-US" dirty="0"/>
+              <a:t> simulations of hardware acceleration via matrix multiplication in CNN using </a:t>
+            </a:r>
+            <a:r>
+              <a:rPr lang="en-US" dirty="0" err="1"/>
+              <a:t>FeFETs</a:t>
+            </a:r>
+            <a:endParaRPr lang="en-US" dirty="0"/>
+          </a:p>
+          <a:p>
+            <a:r>
+              <a:rPr lang="en-US" dirty="0"/>
+              <a:t>Final report</a:t>
+            </a:r>
+          </a:p>
+        </p:txBody>
+      </p:sp>
+    </p:spTree>
+    <p:extLst>
+      <p:ext uri="{BB962C8B-B14F-4D97-AF65-F5344CB8AC3E}">
+        <p14:creationId xmlns:p14="http://schemas.microsoft.com/office/powerpoint/2010/main" val="3936418568"/>
+      </p:ext>
+    </p:extLst>
+  </p:cSld>
+  <p:clrMapOvr>
+    <a:masterClrMapping/>
+  </p:clrMapOvr>
+</p:sld>
+</file>
+
 <file path=ppt/slides/slide3.xml><?xml version="1.0" encoding="utf-8"?>
 <p:sld xmlns:a="http://schemas.openxmlformats.org/drawingml/2006/main" xmlns:r="http://schemas.openxmlformats.org/officeDocument/2006/relationships" xmlns:p="http://schemas.openxmlformats.org/presentationml/2006/main">
   <p:cSld>

</xml_diff>